<commit_message>
update figures, remove old ones
</commit_message>
<xml_diff>
--- a/Materials/figures manually created/Fig. 1.pptx
+++ b/Materials/figures manually created/Fig. 1.pptx
@@ -209,7 +209,7 @@
           <a:p>
             <a:fld id="{77C10B95-DE72-CA42-8E03-6337D8532236}" type="datetimeFigureOut">
               <a:rPr lang="de-DE" smtClean="0"/>
-              <a:t>08.01.2025</a:t>
+              <a:t>10.01.2025</a:t>
             </a:fld>
             <a:endParaRPr lang="de-DE"/>
           </a:p>
@@ -696,7 +696,7 @@
           <a:p>
             <a:fld id="{24188342-571A-6841-AC1D-E620118845AD}" type="datetimeFigureOut">
               <a:rPr lang="en-US" smtClean="0"/>
-              <a:t>1/8/2025</a:t>
+              <a:t>1/10/2025</a:t>
             </a:fld>
             <a:endParaRPr lang="en-US"/>
           </a:p>
@@ -866,7 +866,7 @@
           <a:p>
             <a:fld id="{24188342-571A-6841-AC1D-E620118845AD}" type="datetimeFigureOut">
               <a:rPr lang="en-US" smtClean="0"/>
-              <a:t>1/8/2025</a:t>
+              <a:t>1/10/2025</a:t>
             </a:fld>
             <a:endParaRPr lang="en-US"/>
           </a:p>
@@ -1046,7 +1046,7 @@
           <a:p>
             <a:fld id="{24188342-571A-6841-AC1D-E620118845AD}" type="datetimeFigureOut">
               <a:rPr lang="en-US" smtClean="0"/>
-              <a:t>1/8/2025</a:t>
+              <a:t>1/10/2025</a:t>
             </a:fld>
             <a:endParaRPr lang="en-US"/>
           </a:p>
@@ -1216,7 +1216,7 @@
           <a:p>
             <a:fld id="{24188342-571A-6841-AC1D-E620118845AD}" type="datetimeFigureOut">
               <a:rPr lang="en-US" smtClean="0"/>
-              <a:t>1/8/2025</a:t>
+              <a:t>1/10/2025</a:t>
             </a:fld>
             <a:endParaRPr lang="en-US"/>
           </a:p>
@@ -1460,7 +1460,7 @@
           <a:p>
             <a:fld id="{24188342-571A-6841-AC1D-E620118845AD}" type="datetimeFigureOut">
               <a:rPr lang="en-US" smtClean="0"/>
-              <a:t>1/8/2025</a:t>
+              <a:t>1/10/2025</a:t>
             </a:fld>
             <a:endParaRPr lang="en-US"/>
           </a:p>
@@ -1692,7 +1692,7 @@
           <a:p>
             <a:fld id="{24188342-571A-6841-AC1D-E620118845AD}" type="datetimeFigureOut">
               <a:rPr lang="en-US" smtClean="0"/>
-              <a:t>1/8/2025</a:t>
+              <a:t>1/10/2025</a:t>
             </a:fld>
             <a:endParaRPr lang="en-US"/>
           </a:p>
@@ -2059,7 +2059,7 @@
           <a:p>
             <a:fld id="{24188342-571A-6841-AC1D-E620118845AD}" type="datetimeFigureOut">
               <a:rPr lang="en-US" smtClean="0"/>
-              <a:t>1/8/2025</a:t>
+              <a:t>1/10/2025</a:t>
             </a:fld>
             <a:endParaRPr lang="en-US"/>
           </a:p>
@@ -2177,7 +2177,7 @@
           <a:p>
             <a:fld id="{24188342-571A-6841-AC1D-E620118845AD}" type="datetimeFigureOut">
               <a:rPr lang="en-US" smtClean="0"/>
-              <a:t>1/8/2025</a:t>
+              <a:t>1/10/2025</a:t>
             </a:fld>
             <a:endParaRPr lang="en-US"/>
           </a:p>
@@ -2272,7 +2272,7 @@
           <a:p>
             <a:fld id="{24188342-571A-6841-AC1D-E620118845AD}" type="datetimeFigureOut">
               <a:rPr lang="en-US" smtClean="0"/>
-              <a:t>1/8/2025</a:t>
+              <a:t>1/10/2025</a:t>
             </a:fld>
             <a:endParaRPr lang="en-US"/>
           </a:p>
@@ -2549,7 +2549,7 @@
           <a:p>
             <a:fld id="{24188342-571A-6841-AC1D-E620118845AD}" type="datetimeFigureOut">
               <a:rPr lang="en-US" smtClean="0"/>
-              <a:t>1/8/2025</a:t>
+              <a:t>1/10/2025</a:t>
             </a:fld>
             <a:endParaRPr lang="en-US"/>
           </a:p>
@@ -2806,7 +2806,7 @@
           <a:p>
             <a:fld id="{24188342-571A-6841-AC1D-E620118845AD}" type="datetimeFigureOut">
               <a:rPr lang="en-US" smtClean="0"/>
-              <a:t>1/8/2025</a:t>
+              <a:t>1/10/2025</a:t>
             </a:fld>
             <a:endParaRPr lang="en-US"/>
           </a:p>
@@ -3019,7 +3019,7 @@
           <a:p>
             <a:fld id="{24188342-571A-6841-AC1D-E620118845AD}" type="datetimeFigureOut">
               <a:rPr lang="en-US" smtClean="0"/>
-              <a:t>1/8/2025</a:t>
+              <a:t>1/10/2025</a:t>
             </a:fld>
             <a:endParaRPr lang="en-US"/>
           </a:p>
@@ -3519,7 +3519,10 @@
           <a:p>
             <a:pPr algn="ctr"/>
             <a:r>
-              <a:rPr lang="en-US" sz="1600" dirty="0"/>
+              <a:rPr lang="en-US" sz="1600" dirty="0">
+                <a:latin typeface="Times New Roman" panose="02020603050405020304" pitchFamily="18" charset="0"/>
+                <a:cs typeface="Times New Roman" panose="02020603050405020304" pitchFamily="18" charset="0"/>
+              </a:rPr>
               <a:t>Loss of therapist jobs</a:t>
             </a:r>
           </a:p>
@@ -3577,7 +3580,10 @@
           <a:lstStyle/>
           <a:p>
             <a:pPr algn="ctr"/>
-            <a:endParaRPr lang="en-US" sz="4000"/>
+            <a:endParaRPr lang="en-US" sz="4000">
+              <a:latin typeface="Times New Roman" panose="02020603050405020304" pitchFamily="18" charset="0"/>
+              <a:cs typeface="Times New Roman" panose="02020603050405020304" pitchFamily="18" charset="0"/>
+            </a:endParaRPr>
           </a:p>
         </p:txBody>
       </p:sp>
@@ -3678,7 +3684,10 @@
           <a:p>
             <a:pPr algn="ctr"/>
             <a:r>
-              <a:rPr lang="en-US" sz="4000" dirty="0"/>
+              <a:rPr lang="en-US" sz="4000" dirty="0">
+                <a:latin typeface="Times New Roman" panose="02020603050405020304" pitchFamily="18" charset="0"/>
+                <a:cs typeface="Times New Roman" panose="02020603050405020304" pitchFamily="18" charset="0"/>
+              </a:rPr>
               <a:t>xxx</a:t>
             </a:r>
           </a:p>
@@ -3736,7 +3745,10 @@
           <a:lstStyle/>
           <a:p>
             <a:pPr algn="ctr"/>
-            <a:endParaRPr lang="en-US" sz="4000"/>
+            <a:endParaRPr lang="en-US" sz="4000">
+              <a:latin typeface="Times New Roman" panose="02020603050405020304" pitchFamily="18" charset="0"/>
+              <a:cs typeface="Times New Roman" panose="02020603050405020304" pitchFamily="18" charset="0"/>
+            </a:endParaRPr>
           </a:p>
         </p:txBody>
       </p:sp>
@@ -3838,7 +3850,10 @@
           <a:lstStyle/>
           <a:p>
             <a:pPr algn="ctr"/>
-            <a:endParaRPr lang="en-US" sz="4000"/>
+            <a:endParaRPr lang="en-US" sz="4000">
+              <a:latin typeface="Times New Roman" panose="02020603050405020304" pitchFamily="18" charset="0"/>
+              <a:cs typeface="Times New Roman" panose="02020603050405020304" pitchFamily="18" charset="0"/>
+            </a:endParaRPr>
           </a:p>
         </p:txBody>
       </p:sp>
@@ -3938,7 +3953,10 @@
           <a:p>
             <a:pPr algn="ctr"/>
             <a:r>
-              <a:rPr lang="en-US" sz="1600" dirty="0"/>
+              <a:rPr lang="en-US" sz="1600" dirty="0">
+                <a:latin typeface="Times New Roman" panose="02020603050405020304" pitchFamily="18" charset="0"/>
+                <a:cs typeface="Times New Roman" panose="02020603050405020304" pitchFamily="18" charset="0"/>
+              </a:rPr>
               <a:t>No human contact</a:t>
             </a:r>
           </a:p>
@@ -4039,7 +4057,10 @@
           <a:p>
             <a:pPr algn="ctr"/>
             <a:r>
-              <a:rPr lang="en-US" sz="1600" dirty="0"/>
+              <a:rPr lang="en-US" sz="1600" dirty="0">
+                <a:latin typeface="Times New Roman" panose="02020603050405020304" pitchFamily="18" charset="0"/>
+                <a:cs typeface="Times New Roman" panose="02020603050405020304" pitchFamily="18" charset="0"/>
+              </a:rPr>
               <a:t>Low risk of injury</a:t>
             </a:r>
           </a:p>
@@ -4097,7 +4118,10 @@
           <a:lstStyle/>
           <a:p>
             <a:pPr algn="ctr"/>
-            <a:endParaRPr lang="en-US" sz="4000"/>
+            <a:endParaRPr lang="en-US" sz="4000">
+              <a:latin typeface="Times New Roman" panose="02020603050405020304" pitchFamily="18" charset="0"/>
+              <a:cs typeface="Times New Roman" panose="02020603050405020304" pitchFamily="18" charset="0"/>
+            </a:endParaRPr>
           </a:p>
         </p:txBody>
       </p:sp>
@@ -4197,14 +4221,12 @@
           <a:p>
             <a:pPr algn="ctr"/>
             <a:r>
-              <a:rPr lang="en-US" sz="1600" dirty="0"/>
-              <a:t>Non-judgmental </a:t>
-            </a:r>
-            <a:r>
-              <a:rPr lang="en-US" sz="1600" dirty="0" err="1"/>
-              <a:t>feedack</a:t>
-            </a:r>
-            <a:endParaRPr lang="en-US" sz="1600" dirty="0"/>
+              <a:rPr lang="en-US" sz="1600" dirty="0">
+                <a:latin typeface="Times New Roman" panose="02020603050405020304" pitchFamily="18" charset="0"/>
+                <a:cs typeface="Times New Roman" panose="02020603050405020304" pitchFamily="18" charset="0"/>
+              </a:rPr>
+              <a:t>Non-judgmental feedback</a:t>
+            </a:r>
           </a:p>
         </p:txBody>
       </p:sp>
@@ -4304,7 +4326,10 @@
           <a:p>
             <a:pPr algn="ctr"/>
             <a:r>
-              <a:rPr lang="en-US" sz="1600" dirty="0"/>
+              <a:rPr lang="en-US" sz="1600" dirty="0">
+                <a:latin typeface="Times New Roman" panose="02020603050405020304" pitchFamily="18" charset="0"/>
+                <a:cs typeface="Times New Roman" panose="02020603050405020304" pitchFamily="18" charset="0"/>
+              </a:rPr>
               <a:t>Risk of dependency</a:t>
             </a:r>
           </a:p>
@@ -4410,7 +4435,10 @@
           <a:lstStyle/>
           <a:p>
             <a:pPr algn="ctr"/>
-            <a:endParaRPr lang="en-US" sz="4000"/>
+            <a:endParaRPr lang="en-US" sz="4000">
+              <a:latin typeface="Times New Roman" panose="02020603050405020304" pitchFamily="18" charset="0"/>
+              <a:cs typeface="Times New Roman" panose="02020603050405020304" pitchFamily="18" charset="0"/>
+            </a:endParaRPr>
           </a:p>
         </p:txBody>
       </p:sp>
@@ -5002,7 +5030,10 @@
           <a:lstStyle/>
           <a:p>
             <a:pPr algn="ctr"/>
-            <a:endParaRPr lang="en-US" sz="4000"/>
+            <a:endParaRPr lang="en-US" sz="4000">
+              <a:latin typeface="Times New Roman" panose="02020603050405020304" pitchFamily="18" charset="0"/>
+              <a:cs typeface="Times New Roman" panose="02020603050405020304" pitchFamily="18" charset="0"/>
+            </a:endParaRPr>
           </a:p>
         </p:txBody>
       </p:sp>

</xml_diff>